<commit_message>
add lesson 5 d pptx fix typo
</commit_message>
<xml_diff>
--- a/lessons/Day5_supervised_unsupervised/D_unsupervised.pptx
+++ b/lessons/Day5_supervised_unsupervised/D_unsupervised.pptx
@@ -31804,18 +31804,22 @@
           <a:lstStyle/>
           <a:p>
             <a:r>
-              <a:rPr lang="en-US" dirty="0"/>
-              <a:t>Open A</a:t>
+              <a:rPr lang="en-US" sz="2400" dirty="0"/>
+              <a:t>Open </a:t>
             </a:r>
             <a:r>
-              <a:rPr lang="en-US"/>
-              <a:t>_</a:t>
+              <a:rPr lang="en-US" sz="2400" dirty="0" err="1"/>
+              <a:t>G_kmeans_nonText.R</a:t>
             </a:r>
             <a:r>
-              <a:rPr lang="en-US" dirty="0" err="1"/>
-              <a:t>kmean_clustering.R</a:t>
+              <a:rPr lang="en-US" sz="2400" dirty="0"/>
+              <a:t> &amp; </a:t>
             </a:r>
-            <a:endParaRPr lang="en-US" dirty="0"/>
+            <a:r>
+              <a:rPr lang="en-US" sz="2400" dirty="0" err="1"/>
+              <a:t>H_kmeans_withText.R</a:t>
+            </a:r>
+            <a:endParaRPr lang="en-US" sz="2400" dirty="0"/>
           </a:p>
         </p:txBody>
       </p:sp>
@@ -32044,7 +32048,7 @@
         <p:spPr>
           <a:xfrm>
             <a:off x="454596" y="1897380"/>
-            <a:ext cx="3957385" cy="2308324"/>
+            <a:ext cx="3957385" cy="1477328"/>
           </a:xfrm>
           <a:prstGeom prst="rect">
             <a:avLst/>
@@ -32063,7 +32067,7 @@
             </a:pPr>
             <a:r>
               <a:rPr lang="en-US" dirty="0"/>
-              <a:t>Use K-Means for customer segmentation</a:t>
+              <a:t>Use K-Means for customer segmentation and for document similarities</a:t>
             </a:r>
           </a:p>
           <a:p>
@@ -32074,16 +32078,6 @@
             <a:r>
               <a:rPr lang="en-US" dirty="0"/>
               <a:t>Use Elbow Method to choose the optimal K</a:t>
-            </a:r>
-          </a:p>
-          <a:p>
-            <a:pPr marL="285750" indent="-285750">
-              <a:buFont typeface="Arial" panose="020B0604020202020204" pitchFamily="34" charset="0"/>
-              <a:buChar char="•"/>
-            </a:pPr>
-            <a:r>
-              <a:rPr lang="en-US" dirty="0"/>
-              <a:t>Apply the cluster identities to new records by measuring new record distances to the identified cluster centroids.</a:t>
             </a:r>
           </a:p>
         </p:txBody>
@@ -32984,17 +32978,22 @@
           <a:lstStyle/>
           <a:p>
             <a:r>
-              <a:rPr lang="en-US" dirty="0"/>
+              <a:rPr lang="en-US" sz="2400" dirty="0"/>
               <a:t>You can also try K- </a:t>
             </a:r>
             <a:r>
-              <a:rPr lang="en-US" dirty="0" err="1"/>
+              <a:rPr lang="en-US" sz="2400" dirty="0" err="1"/>
               <a:t>Mediod</a:t>
             </a:r>
             <a:r>
-              <a:rPr lang="en-US" dirty="0"/>
-              <a:t> Clustering</a:t>
+              <a:rPr lang="en-US" sz="2400" dirty="0"/>
+              <a:t> Clustering: </a:t>
             </a:r>
+            <a:r>
+              <a:rPr lang="en-US" sz="2400" dirty="0" err="1"/>
+              <a:t>I_kmediods.R</a:t>
+            </a:r>
+            <a:endParaRPr lang="en-US" sz="2400" dirty="0"/>
           </a:p>
         </p:txBody>
       </p:sp>
@@ -40567,7 +40566,7 @@
             </a:r>
             <a:r>
               <a:rPr lang="en-US" sz="2400" dirty="0" err="1"/>
-              <a:t>F_spherical_kmeans.R</a:t>
+              <a:t>J_spherical_kmeans.R</a:t>
             </a:r>
             <a:r>
               <a:rPr lang="en-US" sz="2400" dirty="0"/>

</xml_diff>